<commit_message>
Tao slides 8, 9
</commit_message>
<xml_diff>
--- a/slides-steve/Chapter 07.pptx
+++ b/slides-steve/Chapter 07.pptx
@@ -143,6 +143,22 @@
       </a:defRPr>
     </a:lvl9pPr>
   </p:defaultTextStyle>
+  <p:extLst>
+    <p:ext uri="{EFAFB233-063F-42B5-8137-9DF3F51BA10A}">
+      <p15:sldGuideLst xmlns:p15="http://schemas.microsoft.com/office/powerpoint/2012/main">
+        <p15:guide id="1" orient="horz" pos="2160">
+          <p15:clr>
+            <a:srgbClr val="A4A3A4"/>
+          </p15:clr>
+        </p15:guide>
+        <p15:guide id="2" pos="2880">
+          <p15:clr>
+            <a:srgbClr val="A4A3A4"/>
+          </p15:clr>
+        </p15:guide>
+      </p15:sldGuideLst>
+    </p:ext>
+  </p:extLst>
 </p:presentation>
 </file>
 
@@ -228,7 +244,7 @@
           <a:p>
             <a:fld id="{6CD94A41-84B9-724B-940D-26BBE75B065B}" type="datetimeFigureOut">
               <a:rPr lang="en-US" smtClean="0"/>
-              <a:t>9/16/15</a:t>
+              <a:t>9/18/16</a:t>
             </a:fld>
             <a:endParaRPr lang="en-US"/>
           </a:p>
@@ -394,7 +410,7 @@
           <a:p>
             <a:fld id="{E5EBDA09-684D-894D-9013-D82610BE5BD1}" type="datetimeFigureOut">
               <a:rPr lang="en-US" smtClean="0"/>
-              <a:t>9/16/15</a:t>
+              <a:t>9/18/16</a:t>
             </a:fld>
             <a:endParaRPr lang="en-US"/>
           </a:p>
@@ -1142,7 +1158,7 @@
           <a:p>
             <a:fld id="{5BCD222B-7BB0-EF4B-9263-CB7829F15850}" type="datetime1">
               <a:rPr lang="en-US" smtClean="0"/>
-              <a:t>9/16/15</a:t>
+              <a:t>9/18/16</a:t>
             </a:fld>
             <a:endParaRPr lang="en-US"/>
           </a:p>
@@ -1434,7 +1450,7 @@
           <a:p>
             <a:fld id="{2EA4430B-1FF1-664B-8D02-6117BF21413D}" type="datetime1">
               <a:rPr lang="en-US" smtClean="0"/>
-              <a:t>9/16/15</a:t>
+              <a:t>9/18/16</a:t>
             </a:fld>
             <a:endParaRPr lang="en-US"/>
           </a:p>
@@ -1556,7 +1572,7 @@
           <a:p>
             <a:fld id="{AE5FD207-9F07-EB4B-80CF-71E3214F0156}" type="datetime1">
               <a:rPr lang="en-US" smtClean="0"/>
-              <a:t>9/16/15</a:t>
+              <a:t>9/18/16</a:t>
             </a:fld>
             <a:endParaRPr lang="en-US"/>
           </a:p>
@@ -1655,7 +1671,7 @@
           <a:p>
             <a:fld id="{61914B69-B40A-1443-9F33-F026056F2087}" type="datetime1">
               <a:rPr lang="en-US" smtClean="0"/>
-              <a:t>9/16/15</a:t>
+              <a:t>9/18/16</a:t>
             </a:fld>
             <a:endParaRPr lang="en-US"/>
           </a:p>
@@ -1901,7 +1917,7 @@
           <a:p>
             <a:fld id="{18120CA3-27AF-5249-B731-FE71383F972F}" type="datetime1">
               <a:rPr lang="en-US" smtClean="0"/>
-              <a:t>9/16/15</a:t>
+              <a:t>9/18/16</a:t>
             </a:fld>
             <a:endParaRPr lang="en-US"/>
           </a:p>
@@ -2147,7 +2163,7 @@
           <a:p>
             <a:fld id="{A8E8743C-F9A2-504B-9886-3D8C6D026892}" type="datetime1">
               <a:rPr lang="en-US" smtClean="0"/>
-              <a:t>9/16/15</a:t>
+              <a:t>9/18/16</a:t>
             </a:fld>
             <a:endParaRPr lang="en-US"/>
           </a:p>
@@ -2681,7 +2697,7 @@
           <a:p>
             <a:fld id="{27FECA96-A351-4446-B9FD-4BFB4E00571E}" type="datetime1">
               <a:rPr lang="en-US" smtClean="0"/>
-              <a:t>9/16/15</a:t>
+              <a:t>9/18/16</a:t>
             </a:fld>
             <a:endParaRPr lang="en-US"/>
           </a:p>
@@ -2834,7 +2850,7 @@
           <a:p>
             <a:fld id="{4F3BD067-B2A5-6D4F-B65A-821CE7F5A964}" type="datetime1">
               <a:rPr lang="en-US" smtClean="0"/>
-              <a:t>9/16/15</a:t>
+              <a:t>9/18/16</a:t>
             </a:fld>
             <a:endParaRPr lang="en-US"/>
           </a:p>
@@ -3017,7 +3033,7 @@
           <a:p>
             <a:fld id="{3E336CAC-4EC9-434B-8713-8B38A604ABA9}" type="datetime1">
               <a:rPr lang="en-US" smtClean="0"/>
-              <a:t>9/16/15</a:t>
+              <a:t>9/18/16</a:t>
             </a:fld>
             <a:endParaRPr lang="en-US"/>
           </a:p>
@@ -3170,7 +3186,7 @@
           <a:p>
             <a:fld id="{2A1FED82-3738-B54B-84B9-27BDEF0FC9A9}" type="datetime1">
               <a:rPr lang="en-US" smtClean="0"/>
-              <a:t>9/16/15</a:t>
+              <a:t>9/18/16</a:t>
             </a:fld>
             <a:endParaRPr lang="en-US"/>
           </a:p>
@@ -3347,7 +3363,7 @@
           <a:p>
             <a:fld id="{9D922FDC-24EA-2040-9753-E4BD85194008}" type="datetime1">
               <a:rPr lang="en-US" smtClean="0"/>
-              <a:t>9/16/15</a:t>
+              <a:t>9/18/16</a:t>
             </a:fld>
             <a:endParaRPr lang="en-US"/>
           </a:p>
@@ -3528,7 +3544,7 @@
           <a:p>
             <a:fld id="{B63B29F5-DFCA-504F-9DCA-2DA12CC547F0}" type="datetime1">
               <a:rPr lang="en-US" smtClean="0"/>
-              <a:t>9/16/15</a:t>
+              <a:t>9/18/16</a:t>
             </a:fld>
             <a:endParaRPr lang="en-US"/>
           </a:p>
@@ -3691,7 +3707,7 @@
           <a:p>
             <a:fld id="{84C172F0-872D-294E-B5D9-81AC74A6692A}" type="datetime1">
               <a:rPr lang="en-US" smtClean="0"/>
-              <a:t>9/16/15</a:t>
+              <a:t>9/18/16</a:t>
             </a:fld>
             <a:endParaRPr lang="en-US"/>
           </a:p>
@@ -3924,7 +3940,7 @@
           <a:p>
             <a:fld id="{8CB8513C-0EED-C842-B050-CE7D36FAEC3B}" type="datetime1">
               <a:rPr lang="en-US" smtClean="0"/>
-              <a:t>9/16/15</a:t>
+              <a:t>9/18/16</a:t>
             </a:fld>
             <a:endParaRPr lang="en-US"/>
           </a:p>
@@ -4083,7 +4099,7 @@
           <a:p>
             <a:fld id="{8AE072BB-55C9-5B48-8BC5-B676A6136843}" type="datetime1">
               <a:rPr lang="en-US" smtClean="0"/>
-              <a:t>9/16/15</a:t>
+              <a:t>9/18/16</a:t>
             </a:fld>
             <a:endParaRPr lang="en-US"/>
           </a:p>
@@ -4237,7 +4253,15 @@
             </a:r>
             <a:r>
               <a:rPr lang="en-US" dirty="0"/>
-              <a:t>of problems which are at least as hard as the hardest problems in NP. Problems that are NP-hard do not have to be elements of NP; indeed, they may not even be decidable.</a:t>
+              <a:t>of problems which are at least as hard as the hardest problems in NP. Problems that are NP-hard do not have to be elements of NP; indeed, they may not even be </a:t>
+            </a:r>
+            <a:r>
+              <a:rPr lang="en-US" i="1" dirty="0"/>
+              <a:t>decidable</a:t>
+            </a:r>
+            <a:r>
+              <a:rPr lang="en-US" dirty="0"/>
+              <a:t>.</a:t>
             </a:r>
           </a:p>
           <a:p>
@@ -4273,7 +4297,7 @@
           <a:p>
             <a:fld id="{FEDA17CE-FEE3-0341-9716-E4CE742F0B2E}" type="datetime1">
               <a:rPr lang="en-US" smtClean="0"/>
-              <a:t>9/16/15</a:t>
+              <a:t>9/18/16</a:t>
             </a:fld>
             <a:endParaRPr lang="en-US"/>
           </a:p>
@@ -4448,7 +4472,7 @@
           <a:p>
             <a:fld id="{9C2F948D-C809-9141-AD85-292588EADE06}" type="datetime1">
               <a:rPr lang="en-US" smtClean="0"/>
-              <a:t>9/16/15</a:t>
+              <a:t>9/18/16</a:t>
             </a:fld>
             <a:endParaRPr lang="en-US"/>
           </a:p>
@@ -4601,7 +4625,7 @@
           <a:p>
             <a:fld id="{403FB7A8-FED0-4A4C-B908-0F0B5483124E}" type="datetime1">
               <a:rPr lang="en-US" smtClean="0"/>
-              <a:t>9/16/15</a:t>
+              <a:t>9/18/16</a:t>
             </a:fld>
             <a:endParaRPr lang="en-US"/>
           </a:p>
@@ -4764,7 +4788,7 @@
           <a:p>
             <a:fld id="{5F28AB9F-902B-CE46-A9A9-2760731C968D}" type="datetime1">
               <a:rPr lang="en-US" smtClean="0"/>
-              <a:t>9/16/15</a:t>
+              <a:t>9/18/16</a:t>
             </a:fld>
             <a:endParaRPr lang="en-US"/>
           </a:p>
@@ -4953,7 +4977,7 @@
           <a:p>
             <a:fld id="{8896F3E0-B1EC-8244-BAC8-EC2CC45B9173}" type="datetime1">
               <a:rPr lang="en-US" smtClean="0"/>
-              <a:t>9/16/15</a:t>
+              <a:t>9/18/16</a:t>
             </a:fld>
             <a:endParaRPr lang="en-US"/>
           </a:p>
@@ -5145,7 +5169,7 @@
           <a:p>
             <a:fld id="{12048791-6CCF-FB4D-8F65-371453FE0DE2}" type="datetime1">
               <a:rPr lang="en-US" smtClean="0"/>
-              <a:t>9/16/15</a:t>
+              <a:t>9/18/16</a:t>
             </a:fld>
             <a:endParaRPr lang="en-US"/>
           </a:p>
@@ -5321,7 +5345,7 @@
           <a:p>
             <a:fld id="{B8914219-7542-284F-995C-CA4AB1C81DE3}" type="datetime1">
               <a:rPr lang="en-US" smtClean="0"/>
-              <a:t>9/16/15</a:t>
+              <a:t>9/18/16</a:t>
             </a:fld>
             <a:endParaRPr lang="en-US"/>
           </a:p>
@@ -5505,7 +5529,7 @@
           <a:p>
             <a:fld id="{3CC9C4EF-BBA5-164A-8713-4C27C134EDB3}" type="datetime1">
               <a:rPr lang="en-US" smtClean="0"/>
-              <a:t>9/16/15</a:t>
+              <a:t>9/18/16</a:t>
             </a:fld>
             <a:endParaRPr lang="en-US"/>
           </a:p>
@@ -5694,7 +5718,7 @@
           <a:p>
             <a:fld id="{ECBB5F0E-EBCD-8A4C-BD32-D14EE96FAC7F}" type="datetime1">
               <a:rPr lang="en-US" smtClean="0"/>
-              <a:t>9/16/15</a:t>
+              <a:t>9/18/16</a:t>
             </a:fld>
             <a:endParaRPr lang="en-US"/>
           </a:p>
@@ -5875,7 +5899,7 @@
           <a:p>
             <a:fld id="{5F235D05-177F-5445-A5DC-55C0B52184C9}" type="datetime1">
               <a:rPr lang="en-US" smtClean="0"/>
-              <a:t>9/16/15</a:t>
+              <a:t>9/18/16</a:t>
             </a:fld>
             <a:endParaRPr lang="en-US"/>
           </a:p>
@@ -6066,7 +6090,7 @@
           <a:p>
             <a:fld id="{E94E7AEF-256A-1741-9433-E2EE76BF37A7}" type="datetime1">
               <a:rPr lang="en-US" smtClean="0"/>
-              <a:t>9/16/15</a:t>
+              <a:t>9/18/16</a:t>
             </a:fld>
             <a:endParaRPr lang="en-US"/>
           </a:p>
@@ -6249,7 +6273,7 @@
           <a:p>
             <a:fld id="{D461BB06-A2E3-4B48-B02D-61E9F0CC381D}" type="datetime1">
               <a:rPr lang="en-US" smtClean="0"/>
-              <a:t>9/16/15</a:t>
+              <a:t>9/18/16</a:t>
             </a:fld>
             <a:endParaRPr lang="en-US"/>
           </a:p>
@@ -6412,7 +6436,7 @@
           <a:p>
             <a:fld id="{638A0AE1-3E17-9C46-904F-4665BBB4C8EB}" type="datetime1">
               <a:rPr lang="en-US" smtClean="0"/>
-              <a:t>9/16/15</a:t>
+              <a:t>9/18/16</a:t>
             </a:fld>
             <a:endParaRPr lang="en-US"/>
           </a:p>
@@ -6581,7 +6605,7 @@
           <a:p>
             <a:fld id="{90F07A94-5CC7-4144-A420-667F59C6F3E6}" type="datetime1">
               <a:rPr lang="en-US" smtClean="0"/>
-              <a:t>9/16/15</a:t>
+              <a:t>9/18/16</a:t>
             </a:fld>
             <a:endParaRPr lang="en-US"/>
           </a:p>
@@ -6764,7 +6788,7 @@
           <a:p>
             <a:fld id="{AB6102DC-4904-6643-BC66-A492D84A3666}" type="datetime1">
               <a:rPr lang="en-US" smtClean="0"/>
-              <a:t>9/16/15</a:t>
+              <a:t>9/18/16</a:t>
             </a:fld>
             <a:endParaRPr lang="en-US"/>
           </a:p>
@@ -6841,7 +6865,7 @@
   <p:timing>
     <p:tnLst>
       <p:par>
-        <p:cTn xmlns:p14="http://schemas.microsoft.com/office/powerpoint/2010/main" id="1" dur="indefinite" restart="never" nodeType="tmRoot"/>
+        <p:cTn id="1" dur="indefinite" restart="never" nodeType="tmRoot"/>
       </p:par>
     </p:tnLst>
   </p:timing>
@@ -6933,7 +6957,7 @@
           <a:p>
             <a:fld id="{768C0AE8-5819-4643-B6F7-ACE21B0FF891}" type="datetime1">
               <a:rPr lang="en-US" smtClean="0"/>
-              <a:t>9/16/15</a:t>
+              <a:t>9/18/16</a:t>
             </a:fld>
             <a:endParaRPr lang="en-US"/>
           </a:p>
@@ -7010,7 +7034,7 @@
   <p:timing>
     <p:tnLst>
       <p:par>
-        <p:cTn xmlns:p14="http://schemas.microsoft.com/office/powerpoint/2010/main" id="1" dur="indefinite" restart="never" nodeType="tmRoot"/>
+        <p:cTn id="1" dur="indefinite" restart="never" nodeType="tmRoot"/>
       </p:par>
     </p:tnLst>
   </p:timing>
@@ -7124,7 +7148,7 @@
           <a:p>
             <a:fld id="{16C62CFC-43FF-344B-B2D3-E0947B8C3FCA}" type="datetime1">
               <a:rPr lang="en-US" smtClean="0"/>
-              <a:t>9/16/15</a:t>
+              <a:t>9/18/16</a:t>
             </a:fld>
             <a:endParaRPr lang="en-US"/>
           </a:p>
@@ -7293,7 +7317,7 @@
           <a:p>
             <a:fld id="{5BCD222B-7BB0-EF4B-9263-CB7829F15850}" type="datetime1">
               <a:rPr lang="en-US" smtClean="0"/>
-              <a:t>9/16/15</a:t>
+              <a:t>9/18/16</a:t>
             </a:fld>
             <a:endParaRPr lang="en-US"/>
           </a:p>
@@ -7445,7 +7469,7 @@
           <a:p>
             <a:fld id="{959BD9E0-25F7-3242-B56C-2B89001F0F45}" type="datetime1">
               <a:rPr lang="en-US" smtClean="0"/>
-              <a:t>9/16/15</a:t>
+              <a:t>9/18/16</a:t>
             </a:fld>
             <a:endParaRPr lang="en-US"/>
           </a:p>
@@ -7635,7 +7659,7 @@
           <a:p>
             <a:fld id="{FA5B76DB-062C-6B4E-AA4E-349552D81D71}" type="datetime1">
               <a:rPr lang="en-US" smtClean="0"/>
-              <a:t>9/16/15</a:t>
+              <a:t>9/18/16</a:t>
             </a:fld>
             <a:endParaRPr lang="en-US"/>
           </a:p>
@@ -7816,7 +7840,7 @@
           <a:p>
             <a:fld id="{C9C965CE-1778-3143-9D7E-548A3101BB5D}" type="datetime1">
               <a:rPr lang="en-US" smtClean="0"/>
-              <a:t>9/16/15</a:t>
+              <a:t>9/18/16</a:t>
             </a:fld>
             <a:endParaRPr lang="en-US"/>
           </a:p>
@@ -7985,7 +8009,7 @@
           <a:p>
             <a:fld id="{1CD7437B-FFCD-1847-B77C-B77722686705}" type="datetime1">
               <a:rPr lang="en-US" smtClean="0"/>
-              <a:t>9/16/15</a:t>
+              <a:t>9/18/16</a:t>
             </a:fld>
             <a:endParaRPr lang="en-US"/>
           </a:p>
@@ -8201,7 +8225,7 @@
           <a:p>
             <a:fld id="{47564FE5-2317-ED47-935B-8F10B1D6BF44}" type="datetime1">
               <a:rPr lang="en-US" smtClean="0"/>
-              <a:t>9/16/15</a:t>
+              <a:t>9/18/16</a:t>
             </a:fld>
             <a:endParaRPr lang="en-US"/>
           </a:p>
@@ -8374,7 +8398,7 @@
           <a:p>
             <a:fld id="{471E9348-C64A-5B44-9748-BF59A845CB5D}" type="datetime1">
               <a:rPr lang="en-US" smtClean="0"/>
-              <a:t>9/16/15</a:t>
+              <a:t>9/18/16</a:t>
             </a:fld>
             <a:endParaRPr lang="en-US"/>
           </a:p>

</xml_diff>